<commit_message>
tweaked the link colors in the presentation and fixed up the links in the readme.
</commit_message>
<xml_diff>
--- a/02. ConFoo2023 - Building an interactive Slack bot.pptx
+++ b/02. ConFoo2023 - Building an interactive Slack bot.pptx
@@ -223,7 +223,7 @@
           <a:p>
             <a:fld id="{5C385B3F-E6ED-484E-9C7E-DD76C6A68896}" type="datetimeFigureOut">
               <a:rPr lang="en-US" smtClean="0"/>
-              <a:t>2/23/2023</a:t>
+              <a:t>2/24/2023</a:t>
             </a:fld>
             <a:endParaRPr lang="en-US"/>
           </a:p>
@@ -1675,7 +1675,7 @@
           <a:p>
             <a:fld id="{08B15B53-BA0B-46B7-9831-4A77F84F3E8E}" type="datetimeFigureOut">
               <a:rPr lang="en-US" smtClean="0"/>
-              <a:t>2/23/2023</a:t>
+              <a:t>2/24/2023</a:t>
             </a:fld>
             <a:endParaRPr lang="en-US"/>
           </a:p>
@@ -1885,7 +1885,7 @@
           <a:p>
             <a:fld id="{08B15B53-BA0B-46B7-9831-4A77F84F3E8E}" type="datetimeFigureOut">
               <a:rPr lang="en-US" smtClean="0"/>
-              <a:t>2/23/2023</a:t>
+              <a:t>2/24/2023</a:t>
             </a:fld>
             <a:endParaRPr lang="en-US"/>
           </a:p>
@@ -2105,7 +2105,7 @@
           <a:p>
             <a:fld id="{08B15B53-BA0B-46B7-9831-4A77F84F3E8E}" type="datetimeFigureOut">
               <a:rPr lang="en-US" smtClean="0"/>
-              <a:t>2/23/2023</a:t>
+              <a:t>2/24/2023</a:t>
             </a:fld>
             <a:endParaRPr lang="en-US"/>
           </a:p>
@@ -2315,7 +2315,7 @@
           <a:p>
             <a:fld id="{08B15B53-BA0B-46B7-9831-4A77F84F3E8E}" type="datetimeFigureOut">
               <a:rPr lang="en-US" smtClean="0"/>
-              <a:t>2/23/2023</a:t>
+              <a:t>2/24/2023</a:t>
             </a:fld>
             <a:endParaRPr lang="en-US"/>
           </a:p>
@@ -2602,7 +2602,7 @@
           <a:p>
             <a:fld id="{08B15B53-BA0B-46B7-9831-4A77F84F3E8E}" type="datetimeFigureOut">
               <a:rPr lang="en-US" smtClean="0"/>
-              <a:t>2/23/2023</a:t>
+              <a:t>2/24/2023</a:t>
             </a:fld>
             <a:endParaRPr lang="en-US"/>
           </a:p>
@@ -2879,7 +2879,7 @@
           <a:p>
             <a:fld id="{08B15B53-BA0B-46B7-9831-4A77F84F3E8E}" type="datetimeFigureOut">
               <a:rPr lang="en-US" smtClean="0"/>
-              <a:t>2/23/2023</a:t>
+              <a:t>2/24/2023</a:t>
             </a:fld>
             <a:endParaRPr lang="en-US"/>
           </a:p>
@@ -3303,7 +3303,7 @@
           <a:p>
             <a:fld id="{08B15B53-BA0B-46B7-9831-4A77F84F3E8E}" type="datetimeFigureOut">
               <a:rPr lang="en-US" smtClean="0"/>
-              <a:t>2/23/2023</a:t>
+              <a:t>2/24/2023</a:t>
             </a:fld>
             <a:endParaRPr lang="en-US"/>
           </a:p>
@@ -3456,7 +3456,7 @@
           <a:p>
             <a:fld id="{08B15B53-BA0B-46B7-9831-4A77F84F3E8E}" type="datetimeFigureOut">
               <a:rPr lang="en-US" smtClean="0"/>
-              <a:t>2/23/2023</a:t>
+              <a:t>2/24/2023</a:t>
             </a:fld>
             <a:endParaRPr lang="en-US"/>
           </a:p>
@@ -3581,7 +3581,7 @@
           <a:p>
             <a:fld id="{08B15B53-BA0B-46B7-9831-4A77F84F3E8E}" type="datetimeFigureOut">
               <a:rPr lang="en-US" smtClean="0"/>
-              <a:t>2/23/2023</a:t>
+              <a:t>2/24/2023</a:t>
             </a:fld>
             <a:endParaRPr lang="en-US"/>
           </a:p>
@@ -3904,7 +3904,7 @@
           <a:p>
             <a:fld id="{08B15B53-BA0B-46B7-9831-4A77F84F3E8E}" type="datetimeFigureOut">
               <a:rPr lang="en-US" smtClean="0"/>
-              <a:t>2/23/2023</a:t>
+              <a:t>2/24/2023</a:t>
             </a:fld>
             <a:endParaRPr lang="en-US"/>
           </a:p>
@@ -4204,7 +4204,7 @@
           <a:p>
             <a:fld id="{08B15B53-BA0B-46B7-9831-4A77F84F3E8E}" type="datetimeFigureOut">
               <a:rPr lang="en-US" smtClean="0"/>
-              <a:t>2/23/2023</a:t>
+              <a:t>2/24/2023</a:t>
             </a:fld>
             <a:endParaRPr lang="en-US"/>
           </a:p>
@@ -4457,7 +4457,7 @@
           <a:p>
             <a:fld id="{08B15B53-BA0B-46B7-9831-4A77F84F3E8E}" type="datetimeFigureOut">
               <a:rPr lang="en-US" smtClean="0"/>
-              <a:t>2/23/2023</a:t>
+              <a:t>2/24/2023</a:t>
             </a:fld>
             <a:endParaRPr lang="en-US"/>
           </a:p>
@@ -6066,19 +6066,16 @@
               <a:r>
                 <a:rPr lang="en-US" sz="2800" dirty="0">
                   <a:solidFill>
-                    <a:schemeClr val="accent5"/>
+                    <a:schemeClr val="accent1"/>
                   </a:solidFill>
-                  <a:hlinkClick r:id="rId4">
-                    <a:extLst>
-                      <a:ext uri="{A12FA001-AC4F-418D-AE19-62706E023703}">
-                        <ahyp:hlinkClr xmlns:ahyp="http://schemas.microsoft.com/office/drawing/2018/hyperlinkcolor" val="tx"/>
-                      </a:ext>
-                    </a:extLst>
-                  </a:hlinkClick>
                 </a:rPr>
                 <a:t>http://bit.ly/37zJbp5</a:t>
               </a:r>
-              <a:endParaRPr lang="en-CA" sz="2800" dirty="0"/>
+              <a:endParaRPr lang="en-CA" sz="2800" dirty="0">
+                <a:solidFill>
+                  <a:schemeClr val="accent1"/>
+                </a:solidFill>
+              </a:endParaRPr>
             </a:p>
           </p:txBody>
         </p:sp>
@@ -6154,7 +6151,7 @@
             <p:nvPr/>
           </p:nvPicPr>
           <p:blipFill>
-            <a:blip r:embed="rId5">
+            <a:blip r:embed="rId4">
               <a:extLst>
                 <a:ext uri="{28A0092B-C50C-407E-A947-70E740481C1C}">
                   <a14:useLocalDpi xmlns:a14="http://schemas.microsoft.com/office/drawing/2010/main" val="0"/>
@@ -6325,7 +6322,7 @@
                 <a:r>
                   <a:rPr lang="en-US" sz="3200" dirty="0">
                     <a:solidFill>
-                      <a:schemeClr val="accent5"/>
+                      <a:schemeClr val="accent1"/>
                     </a:solidFill>
                     <a:latin typeface="+mn-lt"/>
                   </a:rPr>
@@ -6349,7 +6346,7 @@
               <p:nvPr/>
             </p:nvPicPr>
             <p:blipFill>
-              <a:blip r:embed="rId6">
+              <a:blip r:embed="rId5">
                 <a:extLst>
                   <a:ext uri="{28A0092B-C50C-407E-A947-70E740481C1C}">
                     <a14:useLocalDpi xmlns:a14="http://schemas.microsoft.com/office/drawing/2010/main" val="0"/>
@@ -6406,7 +6403,7 @@
               <p:nvPr/>
             </p:nvPicPr>
             <p:blipFill>
-              <a:blip r:embed="rId7">
+              <a:blip r:embed="rId6">
                 <a:extLst>
                   <a:ext uri="{28A0092B-C50C-407E-A947-70E740481C1C}">
                     <a14:useLocalDpi xmlns:a14="http://schemas.microsoft.com/office/drawing/2010/main" val="0"/>
@@ -6477,7 +6474,7 @@
                 <a:r>
                   <a:rPr lang="en-US" sz="3200" dirty="0">
                     <a:solidFill>
-                      <a:schemeClr val="accent5"/>
+                      <a:schemeClr val="accent1"/>
                     </a:solidFill>
                     <a:latin typeface="+mn-lt"/>
                   </a:rPr>
@@ -6486,7 +6483,7 @@
                 <a:r>
                   <a:rPr lang="en-US" sz="3200" dirty="0" err="1">
                     <a:solidFill>
-                      <a:schemeClr val="accent5"/>
+                      <a:schemeClr val="accent1"/>
                     </a:solidFill>
                     <a:latin typeface="+mn-lt"/>
                   </a:rPr>
@@ -6495,7 +6492,7 @@
                 <a:r>
                   <a:rPr lang="en-US" sz="3200" dirty="0">
                     <a:solidFill>
-                      <a:schemeClr val="accent5"/>
+                      <a:schemeClr val="accent1"/>
                     </a:solidFill>
                     <a:latin typeface="+mn-lt"/>
                   </a:rPr>
@@ -8203,10 +8200,18 @@
               <a:buNone/>
             </a:pPr>
             <a:r>
-              <a:rPr lang="en-US" sz="3200" dirty="0"/>
+              <a:rPr lang="en-US" sz="3200" dirty="0">
+                <a:solidFill>
+                  <a:schemeClr val="accent1"/>
+                </a:solidFill>
+              </a:rPr>
               <a:t>https://github.com/cggallant/confoo-2023</a:t>
             </a:r>
-            <a:endParaRPr lang="en-US" sz="3200" b="1" dirty="0"/>
+            <a:endParaRPr lang="en-US" sz="3200" b="1" dirty="0">
+              <a:solidFill>
+                <a:schemeClr val="accent1"/>
+              </a:solidFill>
+            </a:endParaRPr>
           </a:p>
         </p:txBody>
       </p:sp>

</xml_diff>